<commit_message>
added slide for demo environment
</commit_message>
<xml_diff>
--- a/Modul1/FY16Q2 Azure Intro (IT Camp Hybrid IT).pptx
+++ b/Modul1/FY16Q2 Azure Intro (IT Camp Hybrid IT).pptx
@@ -258,7 +258,7 @@
           <a:p>
             <a:fld id="{53E720BF-5BAB-4715-8B3B-2856BF90270A}" type="datetimeFigureOut">
               <a:rPr lang="de-DE" smtClean="0"/>
-              <a:t>12.10.2015</a:t>
+              <a:t>21.10.2015</a:t>
             </a:fld>
             <a:endParaRPr lang="de-DE"/>
           </a:p>
@@ -423,7 +423,7 @@
           <a:p>
             <a:fld id="{9D9CDDDB-B493-4813-BA5B-F25DD0BAB6F6}" type="datetimeFigureOut">
               <a:rPr lang="en-US" smtClean="0"/>
-              <a:t>10/12/2015</a:t>
+              <a:t>10/21/2015</a:t>
             </a:fld>
             <a:endParaRPr lang="en-US"/>
           </a:p>
@@ -982,7 +982,7 @@
                 <a:latin typeface="Calibri" charset="0"/>
               </a:rPr>
               <a:pPr eaLnBrk="1" hangingPunct="1"/>
-              <a:t>10/12/2015</a:t>
+              <a:t>10/21/2015</a:t>
             </a:fld>
             <a:endParaRPr lang="en-US" sz="1200">
               <a:solidFill>
@@ -1680,7 +1680,7 @@
                   <a:prstClr val="black"/>
                 </a:solidFill>
               </a:rPr>
-              <a:t>10/12/2015 5:10 PM</a:t>
+              <a:t>10/21/2015 11:32 AM</a:t>
             </a:fld>
             <a:endParaRPr lang="en-US" dirty="0">
               <a:solidFill>
@@ -36396,29 +36396,1002 @@
           <a:lstStyle/>
           <a:p>
             <a:r>
-              <a:rPr lang="de-DE" smtClean="0"/>
+              <a:rPr lang="de-DE" dirty="0" smtClean="0"/>
               <a:t>Beispielumgebung</a:t>
             </a:r>
-            <a:endParaRPr lang="de-DE"/>
+            <a:endParaRPr lang="de-DE" dirty="0"/>
           </a:p>
         </p:txBody>
       </p:sp>
       <p:sp>
         <p:nvSpPr>
-          <p:cNvPr id="3" name="Inhaltsplatzhalter 2"/>
-          <p:cNvSpPr>
-            <a:spLocks noGrp="1"/>
-          </p:cNvSpPr>
-          <p:nvPr>
-            <p:ph sz="quarter" idx="12"/>
-          </p:nvPr>
+          <p:cNvPr id="4" name="Rechteck 3"/>
+          <p:cNvSpPr/>
+          <p:nvPr/>
         </p:nvSpPr>
-        <p:spPr/>
+        <p:spPr bwMode="auto">
+          <a:xfrm>
+            <a:off x="600363" y="1995054"/>
+            <a:ext cx="4608946" cy="3241964"/>
+          </a:xfrm>
+          <a:prstGeom prst="rect">
+            <a:avLst/>
+          </a:prstGeom>
+          <a:solidFill>
+            <a:schemeClr val="tx2">
+              <a:lumMod val="20000"/>
+              <a:lumOff val="80000"/>
+            </a:schemeClr>
+          </a:solidFill>
+          <a:ln>
+            <a:noFill/>
+            <a:headEnd type="none" w="med" len="med"/>
+            <a:tailEnd type="none" w="med" len="med"/>
+          </a:ln>
+          <a:effectLst/>
+        </p:spPr>
+        <p:style>
+          <a:lnRef idx="1">
+            <a:schemeClr val="accent2"/>
+          </a:lnRef>
+          <a:fillRef idx="3">
+            <a:schemeClr val="accent2"/>
+          </a:fillRef>
+          <a:effectRef idx="2">
+            <a:schemeClr val="accent2"/>
+          </a:effectRef>
+          <a:fontRef idx="minor">
+            <a:schemeClr val="lt1"/>
+          </a:fontRef>
+        </p:style>
         <p:txBody>
-          <a:bodyPr/>
+          <a:bodyPr rot="0" spcFirstLastPara="0" vertOverflow="overflow" horzOverflow="overflow" vert="horz" wrap="square" lIns="182880" tIns="146304" rIns="182880" bIns="146304" numCol="1" spcCol="0" rtlCol="0" fromWordArt="0" anchor="t" anchorCtr="0" forceAA="0" compatLnSpc="1">
+            <a:prstTxWarp prst="textNoShape">
+              <a:avLst/>
+            </a:prstTxWarp>
+            <a:noAutofit/>
+          </a:bodyPr>
           <a:lstStyle/>
           <a:p>
-            <a:endParaRPr lang="de-DE"/>
+            <a:pPr algn="ctr" defTabSz="932472" fontAlgn="base">
+              <a:lnSpc>
+                <a:spcPct val="90000"/>
+              </a:lnSpc>
+              <a:spcBef>
+                <a:spcPct val="0"/>
+              </a:spcBef>
+              <a:spcAft>
+                <a:spcPct val="0"/>
+              </a:spcAft>
+            </a:pPr>
+            <a:endParaRPr lang="de-DE" sz="2000" b="1" dirty="0" smtClean="0">
+              <a:solidFill>
+                <a:schemeClr val="bg1"/>
+              </a:solidFill>
+              <a:latin typeface="+mj-lt"/>
+              <a:ea typeface="Segoe UI" pitchFamily="34" charset="0"/>
+              <a:cs typeface="Segoe UI" pitchFamily="34" charset="0"/>
+            </a:endParaRPr>
+          </a:p>
+        </p:txBody>
+      </p:sp>
+      <p:sp>
+        <p:nvSpPr>
+          <p:cNvPr id="6" name="Textfeld 5"/>
+          <p:cNvSpPr txBox="1"/>
+          <p:nvPr/>
+        </p:nvSpPr>
+        <p:spPr>
+          <a:xfrm>
+            <a:off x="600363" y="1358156"/>
+            <a:ext cx="2512291" cy="517236"/>
+          </a:xfrm>
+          <a:prstGeom prst="rect">
+            <a:avLst/>
+          </a:prstGeom>
+          <a:noFill/>
+        </p:spPr>
+        <p:txBody>
+          <a:bodyPr wrap="none" lIns="182880" tIns="146304" rIns="182880" bIns="146304" rtlCol="0">
+            <a:noAutofit/>
+          </a:bodyPr>
+          <a:lstStyle/>
+          <a:p>
+            <a:pPr>
+              <a:lnSpc>
+                <a:spcPct val="90000"/>
+              </a:lnSpc>
+              <a:spcAft>
+                <a:spcPts val="600"/>
+              </a:spcAft>
+            </a:pPr>
+            <a:r>
+              <a:rPr lang="de-DE" sz="2400" dirty="0" smtClean="0">
+                <a:gradFill>
+                  <a:gsLst>
+                    <a:gs pos="2917">
+                      <a:schemeClr val="tx1"/>
+                    </a:gs>
+                    <a:gs pos="30000">
+                      <a:schemeClr val="tx1"/>
+                    </a:gs>
+                  </a:gsLst>
+                  <a:lin ang="5400000" scaled="0"/>
+                </a:gradFill>
+              </a:rPr>
+              <a:t>On-Prem / RZ</a:t>
+            </a:r>
+          </a:p>
+        </p:txBody>
+      </p:sp>
+      <p:sp>
+        <p:nvSpPr>
+          <p:cNvPr id="7" name="Textfeld 6"/>
+          <p:cNvSpPr txBox="1"/>
+          <p:nvPr/>
+        </p:nvSpPr>
+        <p:spPr>
+          <a:xfrm>
+            <a:off x="6996545" y="1358567"/>
+            <a:ext cx="2512291" cy="517236"/>
+          </a:xfrm>
+          <a:prstGeom prst="rect">
+            <a:avLst/>
+          </a:prstGeom>
+          <a:noFill/>
+        </p:spPr>
+        <p:txBody>
+          <a:bodyPr wrap="none" lIns="182880" tIns="146304" rIns="182880" bIns="146304" rtlCol="0">
+            <a:noAutofit/>
+          </a:bodyPr>
+          <a:lstStyle/>
+          <a:p>
+            <a:pPr>
+              <a:lnSpc>
+                <a:spcPct val="90000"/>
+              </a:lnSpc>
+              <a:spcAft>
+                <a:spcPts val="600"/>
+              </a:spcAft>
+            </a:pPr>
+            <a:r>
+              <a:rPr lang="de-DE" sz="2400" dirty="0" smtClean="0">
+                <a:gradFill>
+                  <a:gsLst>
+                    <a:gs pos="2917">
+                      <a:schemeClr val="tx1"/>
+                    </a:gs>
+                    <a:gs pos="30000">
+                      <a:schemeClr val="tx1"/>
+                    </a:gs>
+                  </a:gsLst>
+                  <a:lin ang="5400000" scaled="0"/>
+                </a:gradFill>
+              </a:rPr>
+              <a:t>Off-Prem / Cloud</a:t>
+            </a:r>
+          </a:p>
+        </p:txBody>
+      </p:sp>
+      <p:sp>
+        <p:nvSpPr>
+          <p:cNvPr id="8" name="Rechteck 7"/>
+          <p:cNvSpPr/>
+          <p:nvPr/>
+        </p:nvSpPr>
+        <p:spPr bwMode="auto">
+          <a:xfrm>
+            <a:off x="6996545" y="1995054"/>
+            <a:ext cx="4608946" cy="3241964"/>
+          </a:xfrm>
+          <a:prstGeom prst="rect">
+            <a:avLst/>
+          </a:prstGeom>
+          <a:solidFill>
+            <a:schemeClr val="accent6">
+              <a:lumMod val="20000"/>
+              <a:lumOff val="80000"/>
+            </a:schemeClr>
+          </a:solidFill>
+          <a:ln>
+            <a:noFill/>
+            <a:headEnd type="none" w="med" len="med"/>
+            <a:tailEnd type="none" w="med" len="med"/>
+          </a:ln>
+          <a:effectLst/>
+        </p:spPr>
+        <p:style>
+          <a:lnRef idx="1">
+            <a:schemeClr val="accent2"/>
+          </a:lnRef>
+          <a:fillRef idx="3">
+            <a:schemeClr val="accent2"/>
+          </a:fillRef>
+          <a:effectRef idx="2">
+            <a:schemeClr val="accent2"/>
+          </a:effectRef>
+          <a:fontRef idx="minor">
+            <a:schemeClr val="lt1"/>
+          </a:fontRef>
+        </p:style>
+        <p:txBody>
+          <a:bodyPr rot="0" spcFirstLastPara="0" vertOverflow="overflow" horzOverflow="overflow" vert="horz" wrap="square" lIns="182880" tIns="146304" rIns="182880" bIns="146304" numCol="1" spcCol="0" rtlCol="0" fromWordArt="0" anchor="t" anchorCtr="0" forceAA="0" compatLnSpc="1">
+            <a:prstTxWarp prst="textNoShape">
+              <a:avLst/>
+            </a:prstTxWarp>
+            <a:noAutofit/>
+          </a:bodyPr>
+          <a:lstStyle/>
+          <a:p>
+            <a:pPr algn="ctr" defTabSz="932472" fontAlgn="base">
+              <a:lnSpc>
+                <a:spcPct val="90000"/>
+              </a:lnSpc>
+              <a:spcBef>
+                <a:spcPct val="0"/>
+              </a:spcBef>
+              <a:spcAft>
+                <a:spcPct val="0"/>
+              </a:spcAft>
+            </a:pPr>
+            <a:endParaRPr lang="de-DE" sz="2000" b="1" dirty="0" smtClean="0">
+              <a:solidFill>
+                <a:schemeClr val="bg1"/>
+              </a:solidFill>
+              <a:latin typeface="+mj-lt"/>
+              <a:ea typeface="Segoe UI" pitchFamily="34" charset="0"/>
+              <a:cs typeface="Segoe UI" pitchFamily="34" charset="0"/>
+            </a:endParaRPr>
+          </a:p>
+        </p:txBody>
+      </p:sp>
+      <p:pic>
+        <p:nvPicPr>
+          <p:cNvPr id="9" name="Grafik 8"/>
+          <p:cNvPicPr>
+            <a:picLocks noChangeAspect="1"/>
+          </p:cNvPicPr>
+          <p:nvPr/>
+        </p:nvPicPr>
+        <p:blipFill>
+          <a:blip r:embed="rId2" cstate="print">
+            <a:extLst>
+              <a:ext uri="{28A0092B-C50C-407E-A947-70E740481C1C}">
+                <a14:useLocalDpi xmlns:a14="http://schemas.microsoft.com/office/drawing/2010/main" val="0"/>
+              </a:ext>
+            </a:extLst>
+          </a:blip>
+          <a:stretch>
+            <a:fillRect/>
+          </a:stretch>
+        </p:blipFill>
+        <p:spPr>
+          <a:xfrm>
+            <a:off x="5390283" y="2567709"/>
+            <a:ext cx="1435389" cy="1435389"/>
+          </a:xfrm>
+          <a:prstGeom prst="rect">
+            <a:avLst/>
+          </a:prstGeom>
+        </p:spPr>
+      </p:pic>
+      <p:grpSp>
+        <p:nvGrpSpPr>
+          <p:cNvPr id="14" name="Gruppieren 13"/>
+          <p:cNvGrpSpPr/>
+          <p:nvPr/>
+        </p:nvGrpSpPr>
+        <p:grpSpPr>
+          <a:xfrm>
+            <a:off x="1246855" y="2258062"/>
+            <a:ext cx="780290" cy="1251757"/>
+            <a:chOff x="1006710" y="2241806"/>
+            <a:chExt cx="780290" cy="1251757"/>
+          </a:xfrm>
+        </p:grpSpPr>
+        <p:pic>
+          <p:nvPicPr>
+            <p:cNvPr id="10" name="Grafik 9"/>
+            <p:cNvPicPr>
+              <a:picLocks noChangeAspect="1"/>
+            </p:cNvPicPr>
+            <p:nvPr/>
+          </p:nvPicPr>
+          <p:blipFill>
+            <a:blip r:embed="rId3" cstate="print">
+              <a:extLst>
+                <a:ext uri="{28A0092B-C50C-407E-A947-70E740481C1C}">
+                  <a14:useLocalDpi xmlns:a14="http://schemas.microsoft.com/office/drawing/2010/main" val="0"/>
+                </a:ext>
+              </a:extLst>
+            </a:blip>
+            <a:stretch>
+              <a:fillRect/>
+            </a:stretch>
+          </p:blipFill>
+          <p:spPr>
+            <a:xfrm>
+              <a:off x="1006710" y="2241806"/>
+              <a:ext cx="780290" cy="780290"/>
+            </a:xfrm>
+            <a:prstGeom prst="rect">
+              <a:avLst/>
+            </a:prstGeom>
+          </p:spPr>
+        </p:pic>
+        <p:sp>
+          <p:nvSpPr>
+            <p:cNvPr id="12" name="Textfeld 11"/>
+            <p:cNvSpPr txBox="1"/>
+            <p:nvPr/>
+          </p:nvSpPr>
+          <p:spPr>
+            <a:xfrm>
+              <a:off x="1006710" y="2957854"/>
+              <a:ext cx="738909" cy="535709"/>
+            </a:xfrm>
+            <a:prstGeom prst="rect">
+              <a:avLst/>
+            </a:prstGeom>
+            <a:noFill/>
+          </p:spPr>
+          <p:txBody>
+            <a:bodyPr wrap="none" lIns="182880" tIns="146304" rIns="182880" bIns="146304" rtlCol="0">
+              <a:noAutofit/>
+            </a:bodyPr>
+            <a:lstStyle/>
+            <a:p>
+              <a:pPr>
+                <a:lnSpc>
+                  <a:spcPct val="90000"/>
+                </a:lnSpc>
+                <a:spcAft>
+                  <a:spcPts val="600"/>
+                </a:spcAft>
+              </a:pPr>
+              <a:r>
+                <a:rPr lang="de-DE" sz="2400" smtClean="0">
+                  <a:gradFill>
+                    <a:gsLst>
+                      <a:gs pos="2917">
+                        <a:schemeClr val="tx1"/>
+                      </a:gs>
+                      <a:gs pos="30000">
+                        <a:schemeClr val="tx1"/>
+                      </a:gs>
+                    </a:gsLst>
+                    <a:lin ang="5400000" scaled="0"/>
+                  </a:gradFill>
+                </a:rPr>
+                <a:t>DC</a:t>
+              </a:r>
+            </a:p>
+          </p:txBody>
+        </p:sp>
+      </p:grpSp>
+      <p:grpSp>
+        <p:nvGrpSpPr>
+          <p:cNvPr id="15" name="Gruppieren 14"/>
+          <p:cNvGrpSpPr/>
+          <p:nvPr/>
+        </p:nvGrpSpPr>
+        <p:grpSpPr>
+          <a:xfrm>
+            <a:off x="7832618" y="2177565"/>
+            <a:ext cx="780290" cy="1315998"/>
+            <a:chOff x="7292055" y="2177564"/>
+            <a:chExt cx="780290" cy="1315998"/>
+          </a:xfrm>
+        </p:grpSpPr>
+        <p:pic>
+          <p:nvPicPr>
+            <p:cNvPr id="11" name="Grafik 10"/>
+            <p:cNvPicPr>
+              <a:picLocks noChangeAspect="1"/>
+            </p:cNvPicPr>
+            <p:nvPr/>
+          </p:nvPicPr>
+          <p:blipFill>
+            <a:blip r:embed="rId3" cstate="print">
+              <a:extLst>
+                <a:ext uri="{28A0092B-C50C-407E-A947-70E740481C1C}">
+                  <a14:useLocalDpi xmlns:a14="http://schemas.microsoft.com/office/drawing/2010/main" val="0"/>
+                </a:ext>
+              </a:extLst>
+            </a:blip>
+            <a:stretch>
+              <a:fillRect/>
+            </a:stretch>
+          </p:blipFill>
+          <p:spPr>
+            <a:xfrm>
+              <a:off x="7292055" y="2177564"/>
+              <a:ext cx="780290" cy="780290"/>
+            </a:xfrm>
+            <a:prstGeom prst="rect">
+              <a:avLst/>
+            </a:prstGeom>
+          </p:spPr>
+        </p:pic>
+        <p:sp>
+          <p:nvSpPr>
+            <p:cNvPr id="13" name="Textfeld 12"/>
+            <p:cNvSpPr txBox="1"/>
+            <p:nvPr/>
+          </p:nvSpPr>
+          <p:spPr>
+            <a:xfrm>
+              <a:off x="7292055" y="2957853"/>
+              <a:ext cx="738909" cy="535709"/>
+            </a:xfrm>
+            <a:prstGeom prst="rect">
+              <a:avLst/>
+            </a:prstGeom>
+            <a:noFill/>
+          </p:spPr>
+          <p:txBody>
+            <a:bodyPr wrap="none" lIns="182880" tIns="146304" rIns="182880" bIns="146304" rtlCol="0">
+              <a:noAutofit/>
+            </a:bodyPr>
+            <a:lstStyle/>
+            <a:p>
+              <a:pPr>
+                <a:lnSpc>
+                  <a:spcPct val="90000"/>
+                </a:lnSpc>
+                <a:spcAft>
+                  <a:spcPts val="600"/>
+                </a:spcAft>
+              </a:pPr>
+              <a:r>
+                <a:rPr lang="de-DE" sz="2400" dirty="0" smtClean="0">
+                  <a:gradFill>
+                    <a:gsLst>
+                      <a:gs pos="2917">
+                        <a:schemeClr val="tx1"/>
+                      </a:gs>
+                      <a:gs pos="30000">
+                        <a:schemeClr val="tx1"/>
+                      </a:gs>
+                    </a:gsLst>
+                    <a:lin ang="5400000" scaled="0"/>
+                  </a:gradFill>
+                </a:rPr>
+                <a:t>IIS</a:t>
+              </a:r>
+              <a:endParaRPr lang="de-DE" sz="2400" dirty="0" smtClean="0">
+                <a:gradFill>
+                  <a:gsLst>
+                    <a:gs pos="2917">
+                      <a:schemeClr val="tx1"/>
+                    </a:gs>
+                    <a:gs pos="30000">
+                      <a:schemeClr val="tx1"/>
+                    </a:gs>
+                  </a:gsLst>
+                  <a:lin ang="5400000" scaled="0"/>
+                </a:gradFill>
+              </a:endParaRPr>
+            </a:p>
+          </p:txBody>
+        </p:sp>
+      </p:grpSp>
+      <p:grpSp>
+        <p:nvGrpSpPr>
+          <p:cNvPr id="16" name="Gruppieren 15"/>
+          <p:cNvGrpSpPr/>
+          <p:nvPr/>
+        </p:nvGrpSpPr>
+        <p:grpSpPr>
+          <a:xfrm>
+            <a:off x="9384327" y="3377219"/>
+            <a:ext cx="780290" cy="1251757"/>
+            <a:chOff x="1006710" y="2241806"/>
+            <a:chExt cx="780290" cy="1251757"/>
+          </a:xfrm>
+        </p:grpSpPr>
+        <p:pic>
+          <p:nvPicPr>
+            <p:cNvPr id="17" name="Grafik 16"/>
+            <p:cNvPicPr>
+              <a:picLocks noChangeAspect="1"/>
+            </p:cNvPicPr>
+            <p:nvPr/>
+          </p:nvPicPr>
+          <p:blipFill>
+            <a:blip r:embed="rId3" cstate="print">
+              <a:extLst>
+                <a:ext uri="{28A0092B-C50C-407E-A947-70E740481C1C}">
+                  <a14:useLocalDpi xmlns:a14="http://schemas.microsoft.com/office/drawing/2010/main" val="0"/>
+                </a:ext>
+              </a:extLst>
+            </a:blip>
+            <a:stretch>
+              <a:fillRect/>
+            </a:stretch>
+          </p:blipFill>
+          <p:spPr>
+            <a:xfrm>
+              <a:off x="1006710" y="2241806"/>
+              <a:ext cx="780290" cy="780290"/>
+            </a:xfrm>
+            <a:prstGeom prst="rect">
+              <a:avLst/>
+            </a:prstGeom>
+          </p:spPr>
+        </p:pic>
+        <p:sp>
+          <p:nvSpPr>
+            <p:cNvPr id="18" name="Textfeld 17"/>
+            <p:cNvSpPr txBox="1"/>
+            <p:nvPr/>
+          </p:nvSpPr>
+          <p:spPr>
+            <a:xfrm>
+              <a:off x="1006710" y="2957854"/>
+              <a:ext cx="738909" cy="535709"/>
+            </a:xfrm>
+            <a:prstGeom prst="rect">
+              <a:avLst/>
+            </a:prstGeom>
+            <a:noFill/>
+          </p:spPr>
+          <p:txBody>
+            <a:bodyPr wrap="none" lIns="182880" tIns="146304" rIns="182880" bIns="146304" rtlCol="0">
+              <a:noAutofit/>
+            </a:bodyPr>
+            <a:lstStyle/>
+            <a:p>
+              <a:pPr algn="ctr">
+                <a:lnSpc>
+                  <a:spcPct val="90000"/>
+                </a:lnSpc>
+                <a:spcAft>
+                  <a:spcPts val="600"/>
+                </a:spcAft>
+              </a:pPr>
+              <a:r>
+                <a:rPr lang="de-DE" sz="2400" dirty="0" smtClean="0">
+                  <a:gradFill>
+                    <a:gsLst>
+                      <a:gs pos="2917">
+                        <a:schemeClr val="tx1"/>
+                      </a:gs>
+                      <a:gs pos="30000">
+                        <a:schemeClr val="tx1"/>
+                      </a:gs>
+                    </a:gsLst>
+                    <a:lin ang="5400000" scaled="0"/>
+                  </a:gradFill>
+                </a:rPr>
+                <a:t>Linux LAMP</a:t>
+              </a:r>
+            </a:p>
+          </p:txBody>
+        </p:sp>
+      </p:grpSp>
+      <p:grpSp>
+        <p:nvGrpSpPr>
+          <p:cNvPr id="19" name="Gruppieren 18"/>
+          <p:cNvGrpSpPr/>
+          <p:nvPr/>
+        </p:nvGrpSpPr>
+        <p:grpSpPr>
+          <a:xfrm>
+            <a:off x="3182291" y="3472874"/>
+            <a:ext cx="780290" cy="1315998"/>
+            <a:chOff x="7292055" y="2177564"/>
+            <a:chExt cx="780290" cy="1315998"/>
+          </a:xfrm>
+        </p:grpSpPr>
+        <p:pic>
+          <p:nvPicPr>
+            <p:cNvPr id="20" name="Grafik 19"/>
+            <p:cNvPicPr>
+              <a:picLocks noChangeAspect="1"/>
+            </p:cNvPicPr>
+            <p:nvPr/>
+          </p:nvPicPr>
+          <p:blipFill>
+            <a:blip r:embed="rId3" cstate="print">
+              <a:extLst>
+                <a:ext uri="{28A0092B-C50C-407E-A947-70E740481C1C}">
+                  <a14:useLocalDpi xmlns:a14="http://schemas.microsoft.com/office/drawing/2010/main" val="0"/>
+                </a:ext>
+              </a:extLst>
+            </a:blip>
+            <a:stretch>
+              <a:fillRect/>
+            </a:stretch>
+          </p:blipFill>
+          <p:spPr>
+            <a:xfrm>
+              <a:off x="7292055" y="2177564"/>
+              <a:ext cx="780290" cy="780290"/>
+            </a:xfrm>
+            <a:prstGeom prst="rect">
+              <a:avLst/>
+            </a:prstGeom>
+          </p:spPr>
+        </p:pic>
+        <p:sp>
+          <p:nvSpPr>
+            <p:cNvPr id="21" name="Textfeld 20"/>
+            <p:cNvSpPr txBox="1"/>
+            <p:nvPr/>
+          </p:nvSpPr>
+          <p:spPr>
+            <a:xfrm>
+              <a:off x="7292055" y="2957853"/>
+              <a:ext cx="738909" cy="535709"/>
+            </a:xfrm>
+            <a:prstGeom prst="rect">
+              <a:avLst/>
+            </a:prstGeom>
+            <a:noFill/>
+          </p:spPr>
+          <p:txBody>
+            <a:bodyPr wrap="none" lIns="182880" tIns="146304" rIns="182880" bIns="146304" rtlCol="0">
+              <a:noAutofit/>
+            </a:bodyPr>
+            <a:lstStyle/>
+            <a:p>
+              <a:pPr>
+                <a:lnSpc>
+                  <a:spcPct val="90000"/>
+                </a:lnSpc>
+                <a:spcAft>
+                  <a:spcPts val="600"/>
+                </a:spcAft>
+              </a:pPr>
+              <a:r>
+                <a:rPr lang="de-DE" sz="2400" dirty="0" smtClean="0">
+                  <a:gradFill>
+                    <a:gsLst>
+                      <a:gs pos="2917">
+                        <a:schemeClr val="tx1"/>
+                      </a:gs>
+                      <a:gs pos="30000">
+                        <a:schemeClr val="tx1"/>
+                      </a:gs>
+                    </a:gsLst>
+                    <a:lin ang="5400000" scaled="0"/>
+                  </a:gradFill>
+                </a:rPr>
+                <a:t>SQL</a:t>
+              </a:r>
+            </a:p>
+          </p:txBody>
+        </p:sp>
+      </p:grpSp>
+      <p:grpSp>
+        <p:nvGrpSpPr>
+          <p:cNvPr id="22" name="Gruppieren 21"/>
+          <p:cNvGrpSpPr/>
+          <p:nvPr/>
+        </p:nvGrpSpPr>
+        <p:grpSpPr>
+          <a:xfrm>
+            <a:off x="5544559" y="5498567"/>
+            <a:ext cx="1126836" cy="1252446"/>
+            <a:chOff x="5523346" y="5102172"/>
+            <a:chExt cx="1126836" cy="1252446"/>
+          </a:xfrm>
+        </p:grpSpPr>
+        <p:pic>
+          <p:nvPicPr>
+            <p:cNvPr id="3" name="Grafik 2"/>
+            <p:cNvPicPr>
+              <a:picLocks noChangeAspect="1"/>
+            </p:cNvPicPr>
+            <p:nvPr/>
+          </p:nvPicPr>
+          <p:blipFill>
+            <a:blip r:embed="rId4" cstate="print">
+              <a:extLst>
+                <a:ext uri="{28A0092B-C50C-407E-A947-70E740481C1C}">
+                  <a14:useLocalDpi xmlns:a14="http://schemas.microsoft.com/office/drawing/2010/main" val="0"/>
+                </a:ext>
+              </a:extLst>
+            </a:blip>
+            <a:stretch>
+              <a:fillRect/>
+            </a:stretch>
+          </p:blipFill>
+          <p:spPr>
+            <a:xfrm>
+              <a:off x="5712782" y="5102172"/>
+              <a:ext cx="780290" cy="780290"/>
+            </a:xfrm>
+            <a:prstGeom prst="rect">
+              <a:avLst/>
+            </a:prstGeom>
+          </p:spPr>
+        </p:pic>
+        <p:sp>
+          <p:nvSpPr>
+            <p:cNvPr id="5" name="Textfeld 4"/>
+            <p:cNvSpPr txBox="1"/>
+            <p:nvPr/>
+          </p:nvSpPr>
+          <p:spPr>
+            <a:xfrm>
+              <a:off x="5523346" y="5745017"/>
+              <a:ext cx="1126836" cy="609601"/>
+            </a:xfrm>
+            <a:prstGeom prst="rect">
+              <a:avLst/>
+            </a:prstGeom>
+            <a:noFill/>
+          </p:spPr>
+          <p:txBody>
+            <a:bodyPr wrap="none" lIns="182880" tIns="146304" rIns="182880" bIns="146304" rtlCol="0">
+              <a:noAutofit/>
+            </a:bodyPr>
+            <a:lstStyle/>
+            <a:p>
+              <a:pPr>
+                <a:lnSpc>
+                  <a:spcPct val="90000"/>
+                </a:lnSpc>
+                <a:spcAft>
+                  <a:spcPts val="600"/>
+                </a:spcAft>
+              </a:pPr>
+              <a:r>
+                <a:rPr lang="de-DE" sz="2400" dirty="0" smtClean="0">
+                  <a:gradFill>
+                    <a:gsLst>
+                      <a:gs pos="2917">
+                        <a:schemeClr val="tx1"/>
+                      </a:gs>
+                      <a:gs pos="30000">
+                        <a:schemeClr val="tx1"/>
+                      </a:gs>
+                    </a:gsLst>
+                    <a:lin ang="5400000" scaled="0"/>
+                  </a:gradFill>
+                </a:rPr>
+                <a:t>Client</a:t>
+              </a:r>
+              <a:endParaRPr lang="de-DE" sz="2400" dirty="0" smtClean="0">
+                <a:gradFill>
+                  <a:gsLst>
+                    <a:gs pos="2917">
+                      <a:schemeClr val="tx1"/>
+                    </a:gs>
+                    <a:gs pos="30000">
+                      <a:schemeClr val="tx1"/>
+                    </a:gs>
+                  </a:gsLst>
+                  <a:lin ang="5400000" scaled="0"/>
+                </a:gradFill>
+              </a:endParaRPr>
+            </a:p>
+          </p:txBody>
+        </p:sp>
+      </p:grpSp>
+      <p:cxnSp>
+        <p:nvCxnSpPr>
+          <p:cNvPr id="24" name="Gerade Verbindung mit Pfeil 23"/>
+          <p:cNvCxnSpPr>
+            <a:stCxn id="3" idx="3"/>
+            <a:endCxn id="8" idx="2"/>
+          </p:cNvCxnSpPr>
+          <p:nvPr/>
+        </p:nvCxnSpPr>
+        <p:spPr>
+          <a:xfrm flipV="1">
+            <a:off x="6514285" y="5237018"/>
+            <a:ext cx="2786733" cy="651694"/>
+          </a:xfrm>
+          <a:prstGeom prst="straightConnector1">
+            <a:avLst/>
+          </a:prstGeom>
+          <a:ln w="76200">
+            <a:solidFill>
+              <a:schemeClr val="accent1"/>
+            </a:solidFill>
+            <a:headEnd type="triangle"/>
+            <a:tailEnd type="triangle"/>
+          </a:ln>
+        </p:spPr>
+        <p:style>
+          <a:lnRef idx="1">
+            <a:schemeClr val="accent1"/>
+          </a:lnRef>
+          <a:fillRef idx="0">
+            <a:schemeClr val="accent1"/>
+          </a:fillRef>
+          <a:effectRef idx="0">
+            <a:schemeClr val="accent1"/>
+          </a:effectRef>
+          <a:fontRef idx="minor">
+            <a:schemeClr val="tx1"/>
+          </a:fontRef>
+        </p:style>
+      </p:cxnSp>
+      <p:pic>
+        <p:nvPicPr>
+          <p:cNvPr id="25" name="Grafik 24"/>
+          <p:cNvPicPr>
+            <a:picLocks noChangeAspect="1"/>
+          </p:cNvPicPr>
+          <p:nvPr/>
+        </p:nvPicPr>
+        <p:blipFill>
+          <a:blip r:embed="rId5" cstate="print">
+            <a:extLst>
+              <a:ext uri="{28A0092B-C50C-407E-A947-70E740481C1C}">
+                <a14:useLocalDpi xmlns:a14="http://schemas.microsoft.com/office/drawing/2010/main" val="0"/>
+              </a:ext>
+            </a:extLst>
+          </a:blip>
+          <a:stretch>
+            <a:fillRect/>
+          </a:stretch>
+        </p:blipFill>
+        <p:spPr>
+          <a:xfrm flipH="1">
+            <a:off x="11236037" y="2258885"/>
+            <a:ext cx="780290" cy="780290"/>
+          </a:xfrm>
+          <a:prstGeom prst="rect">
+            <a:avLst/>
+          </a:prstGeom>
+        </p:spPr>
+      </p:pic>
+      <p:pic>
+        <p:nvPicPr>
+          <p:cNvPr id="26" name="Grafik 25"/>
+          <p:cNvPicPr>
+            <a:picLocks noChangeAspect="1"/>
+          </p:cNvPicPr>
+          <p:nvPr/>
+        </p:nvPicPr>
+        <p:blipFill>
+          <a:blip r:embed="rId5" cstate="print">
+            <a:extLst>
+              <a:ext uri="{28A0092B-C50C-407E-A947-70E740481C1C}">
+                <a14:useLocalDpi xmlns:a14="http://schemas.microsoft.com/office/drawing/2010/main" val="0"/>
+              </a:ext>
+            </a:extLst>
+          </a:blip>
+          <a:stretch>
+            <a:fillRect/>
+          </a:stretch>
+        </p:blipFill>
+        <p:spPr>
+          <a:xfrm flipH="1">
+            <a:off x="11236037" y="3787707"/>
+            <a:ext cx="780290" cy="780290"/>
+          </a:xfrm>
+          <a:prstGeom prst="rect">
+            <a:avLst/>
+          </a:prstGeom>
+        </p:spPr>
+      </p:pic>
+      <p:sp>
+        <p:nvSpPr>
+          <p:cNvPr id="27" name="Textfeld 26"/>
+          <p:cNvSpPr txBox="1"/>
+          <p:nvPr/>
+        </p:nvSpPr>
+        <p:spPr>
+          <a:xfrm>
+            <a:off x="10977418" y="2669121"/>
+            <a:ext cx="1256145" cy="449565"/>
+          </a:xfrm>
+          <a:prstGeom prst="rect">
+            <a:avLst/>
+          </a:prstGeom>
+          <a:noFill/>
+        </p:spPr>
+        <p:txBody>
+          <a:bodyPr wrap="none" lIns="182880" tIns="146304" rIns="182880" bIns="146304" rtlCol="0">
+            <a:noAutofit/>
+          </a:bodyPr>
+          <a:lstStyle/>
+          <a:p>
+            <a:pPr>
+              <a:lnSpc>
+                <a:spcPct val="90000"/>
+              </a:lnSpc>
+              <a:spcAft>
+                <a:spcPts val="600"/>
+              </a:spcAft>
+            </a:pPr>
+            <a:r>
+              <a:rPr lang="de-DE" sz="2400" dirty="0" smtClean="0">
+                <a:gradFill>
+                  <a:gsLst>
+                    <a:gs pos="2917">
+                      <a:schemeClr val="tx1"/>
+                    </a:gs>
+                    <a:gs pos="30000">
+                      <a:schemeClr val="tx1"/>
+                    </a:gs>
+                  </a:gsLst>
+                  <a:lin ang="5400000" scaled="0"/>
+                </a:gradFill>
+              </a:rPr>
+              <a:t>PIP1:80</a:t>
+            </a:r>
+            <a:endParaRPr lang="de-DE" sz="2400" dirty="0" smtClean="0">
+              <a:gradFill>
+                <a:gsLst>
+                  <a:gs pos="2917">
+                    <a:schemeClr val="tx1"/>
+                  </a:gs>
+                  <a:gs pos="30000">
+                    <a:schemeClr val="tx1"/>
+                  </a:gs>
+                </a:gsLst>
+                <a:lin ang="5400000" scaled="0"/>
+              </a:gradFill>
+            </a:endParaRPr>
+          </a:p>
+        </p:txBody>
+      </p:sp>
+      <p:sp>
+        <p:nvSpPr>
+          <p:cNvPr id="28" name="Textfeld 27"/>
+          <p:cNvSpPr txBox="1"/>
+          <p:nvPr/>
+        </p:nvSpPr>
+        <p:spPr>
+          <a:xfrm>
+            <a:off x="10977418" y="4214614"/>
+            <a:ext cx="1256145" cy="449565"/>
+          </a:xfrm>
+          <a:prstGeom prst="rect">
+            <a:avLst/>
+          </a:prstGeom>
+          <a:noFill/>
+        </p:spPr>
+        <p:txBody>
+          <a:bodyPr wrap="none" lIns="182880" tIns="146304" rIns="182880" bIns="146304" rtlCol="0">
+            <a:noAutofit/>
+          </a:bodyPr>
+          <a:lstStyle/>
+          <a:p>
+            <a:pPr>
+              <a:lnSpc>
+                <a:spcPct val="90000"/>
+              </a:lnSpc>
+              <a:spcAft>
+                <a:spcPts val="600"/>
+              </a:spcAft>
+            </a:pPr>
+            <a:r>
+              <a:rPr lang="de-DE" sz="2400" dirty="0" smtClean="0">
+                <a:gradFill>
+                  <a:gsLst>
+                    <a:gs pos="2917">
+                      <a:schemeClr val="tx1"/>
+                    </a:gs>
+                    <a:gs pos="30000">
+                      <a:schemeClr val="tx1"/>
+                    </a:gs>
+                  </a:gsLst>
+                  <a:lin ang="5400000" scaled="0"/>
+                </a:gradFill>
+              </a:rPr>
+              <a:t>PIP2:80</a:t>
+            </a:r>
+            <a:endParaRPr lang="de-DE" sz="2400" dirty="0" smtClean="0">
+              <a:gradFill>
+                <a:gsLst>
+                  <a:gs pos="2917">
+                    <a:schemeClr val="tx1"/>
+                  </a:gs>
+                  <a:gs pos="30000">
+                    <a:schemeClr val="tx1"/>
+                  </a:gs>
+                </a:gsLst>
+                <a:lin ang="5400000" scaled="0"/>
+              </a:gradFill>
+            </a:endParaRPr>
           </a:p>
         </p:txBody>
       </p:sp>
@@ -36432,7 +37405,7 @@
   <p:clrMapOvr>
     <a:masterClrMapping/>
   </p:clrMapOvr>
-  <p:transition>
+  <p:transition spd="med">
     <p:fade/>
   </p:transition>
 </p:sld>

</xml_diff>